<commit_message>
created development pipeline draft
</commit_message>
<xml_diff>
--- a/doc/tikkiDevelopmentPipeline.pptx
+++ b/doc/tikkiDevelopmentPipeline.pptx
@@ -3744,7 +3744,7 @@
               </a:rPr>
               <a:t>Karlsruhe</a:t>
             </a:r>
-            <a:r>
+            <a:br>
               <a:rPr lang="de-DE" dirty="0" smtClean="0">
                 <a:solidFill>
                   <a:schemeClr val="tx1">
@@ -3752,9 +3752,8 @@
                   </a:schemeClr>
                 </a:solidFill>
               </a:rPr>
-              <a:t/>
-            </a:r>
-            <a:br>
+            </a:br>
+            <a:r>
               <a:rPr lang="de-DE" dirty="0" smtClean="0">
                 <a:solidFill>
                   <a:schemeClr val="tx1">
@@ -3762,24 +3761,8 @@
                   </a:schemeClr>
                 </a:solidFill>
               </a:rPr>
-            </a:br>
-            <a:r>
-              <a:rPr lang="de-DE" dirty="0" smtClean="0">
-                <a:solidFill>
-                  <a:schemeClr val="tx1">
-                    <a:lumMod val="50000"/>
-                  </a:schemeClr>
-                </a:solidFill>
-              </a:rPr>
               <a:t>12.01.2017</a:t>
             </a:r>
-            <a:endParaRPr lang="de-DE" dirty="0" smtClean="0">
-              <a:solidFill>
-                <a:schemeClr val="tx1">
-                  <a:lumMod val="50000"/>
-                </a:schemeClr>
-              </a:solidFill>
-            </a:endParaRPr>
           </a:p>
           <a:p>
             <a:endParaRPr lang="de-DE" sz="1600" dirty="0"/>
@@ -3787,13 +3770,8 @@
           <a:p>
             <a:r>
               <a:rPr lang="de-DE" dirty="0" smtClean="0"/>
-              <a:t>Michael </a:t>
-            </a:r>
-            <a:r>
-              <a:rPr lang="de-DE" dirty="0" smtClean="0"/>
-              <a:t>Wolff</a:t>
-            </a:r>
-            <a:endParaRPr lang="de-DE" dirty="0" smtClean="0"/>
+              <a:t>Michael Wolff</a:t>
+            </a:r>
           </a:p>
         </p:txBody>
       </p:sp>
@@ -4310,6 +4288,644 @@
           </a:fontRef>
         </p:style>
       </p:cxnSp>
+      <p:sp>
+        <p:nvSpPr>
+          <p:cNvPr id="2" name="Textfeld 1"/>
+          <p:cNvSpPr txBox="1"/>
+          <p:nvPr/>
+        </p:nvSpPr>
+        <p:spPr>
+          <a:xfrm>
+            <a:off x="1178618" y="2375719"/>
+            <a:ext cx="662992" cy="188185"/>
+          </a:xfrm>
+          <a:prstGeom prst="rect">
+            <a:avLst/>
+          </a:prstGeom>
+        </p:spPr>
+        <p:txBody>
+          <a:bodyPr vert="horz" wrap="square" lIns="91440" tIns="45720" rIns="91440" bIns="45720" rtlCol="0">
+            <a:noAutofit/>
+          </a:bodyPr>
+          <a:lstStyle/>
+          <a:p>
+            <a:r>
+              <a:rPr lang="de-DE" sz="1000" dirty="0" smtClean="0">
+                <a:solidFill>
+                  <a:schemeClr val="bg1"/>
+                </a:solidFill>
+              </a:rPr>
+              <a:t>Commit</a:t>
+            </a:r>
+          </a:p>
+          <a:p>
+            <a:endParaRPr lang="de-DE" sz="1000" dirty="0" smtClean="0">
+              <a:solidFill>
+                <a:schemeClr val="bg1"/>
+              </a:solidFill>
+            </a:endParaRPr>
+          </a:p>
+        </p:txBody>
+      </p:sp>
+      <p:sp>
+        <p:nvSpPr>
+          <p:cNvPr id="18" name="Textfeld 17"/>
+          <p:cNvSpPr txBox="1"/>
+          <p:nvPr/>
+        </p:nvSpPr>
+        <p:spPr>
+          <a:xfrm>
+            <a:off x="2777372" y="2375719"/>
+            <a:ext cx="662992" cy="188185"/>
+          </a:xfrm>
+          <a:prstGeom prst="rect">
+            <a:avLst/>
+          </a:prstGeom>
+        </p:spPr>
+        <p:txBody>
+          <a:bodyPr vert="horz" wrap="square" lIns="91440" tIns="45720" rIns="91440" bIns="45720" rtlCol="0">
+            <a:noAutofit/>
+          </a:bodyPr>
+          <a:lstStyle/>
+          <a:p>
+            <a:r>
+              <a:rPr lang="de-DE" sz="1000" dirty="0" smtClean="0">
+                <a:solidFill>
+                  <a:schemeClr val="bg1"/>
+                </a:solidFill>
+              </a:rPr>
+              <a:t>Push</a:t>
+            </a:r>
+            <a:endParaRPr lang="de-DE" sz="1000" dirty="0" smtClean="0">
+              <a:solidFill>
+                <a:schemeClr val="bg1"/>
+              </a:solidFill>
+            </a:endParaRPr>
+          </a:p>
+        </p:txBody>
+      </p:sp>
+      <p:sp>
+        <p:nvSpPr>
+          <p:cNvPr id="20" name="Textfeld 19"/>
+          <p:cNvSpPr txBox="1"/>
+          <p:nvPr/>
+        </p:nvSpPr>
+        <p:spPr>
+          <a:xfrm>
+            <a:off x="3316298" y="1972555"/>
+            <a:ext cx="1217539" cy="175835"/>
+          </a:xfrm>
+          <a:prstGeom prst="rect">
+            <a:avLst/>
+          </a:prstGeom>
+        </p:spPr>
+        <p:txBody>
+          <a:bodyPr vert="horz" wrap="square" lIns="91440" tIns="45720" rIns="91440" bIns="45720" rtlCol="0">
+            <a:noAutofit/>
+          </a:bodyPr>
+          <a:lstStyle/>
+          <a:p>
+            <a:r>
+              <a:rPr lang="de-DE" sz="1000" dirty="0" err="1" smtClean="0">
+                <a:solidFill>
+                  <a:schemeClr val="bg1"/>
+                </a:solidFill>
+              </a:rPr>
+              <a:t>github</a:t>
+            </a:r>
+            <a:r>
+              <a:rPr lang="de-DE" sz="1000" dirty="0" smtClean="0">
+                <a:solidFill>
+                  <a:schemeClr val="bg1"/>
+                </a:solidFill>
+              </a:rPr>
+              <a:t> (</a:t>
+            </a:r>
+            <a:r>
+              <a:rPr lang="de-DE" sz="1000" dirty="0" err="1" smtClean="0">
+                <a:solidFill>
+                  <a:schemeClr val="bg1"/>
+                </a:solidFill>
+              </a:rPr>
+              <a:t>repository</a:t>
+            </a:r>
+            <a:r>
+              <a:rPr lang="de-DE" sz="1000" dirty="0" smtClean="0">
+                <a:solidFill>
+                  <a:schemeClr val="bg1"/>
+                </a:solidFill>
+              </a:rPr>
+              <a:t>)</a:t>
+            </a:r>
+          </a:p>
+          <a:p>
+            <a:endParaRPr lang="de-DE" sz="1000" dirty="0" smtClean="0">
+              <a:solidFill>
+                <a:schemeClr val="bg1"/>
+              </a:solidFill>
+            </a:endParaRPr>
+          </a:p>
+        </p:txBody>
+      </p:sp>
+      <p:sp>
+        <p:nvSpPr>
+          <p:cNvPr id="21" name="Textfeld 20"/>
+          <p:cNvSpPr txBox="1"/>
+          <p:nvPr/>
+        </p:nvSpPr>
+        <p:spPr>
+          <a:xfrm>
+            <a:off x="4644008" y="1972556"/>
+            <a:ext cx="1728191" cy="158932"/>
+          </a:xfrm>
+          <a:prstGeom prst="rect">
+            <a:avLst/>
+          </a:prstGeom>
+        </p:spPr>
+        <p:txBody>
+          <a:bodyPr vert="horz" wrap="square" lIns="91440" tIns="45720" rIns="91440" bIns="45720" rtlCol="0">
+            <a:noAutofit/>
+          </a:bodyPr>
+          <a:lstStyle/>
+          <a:p>
+            <a:r>
+              <a:rPr lang="de-DE" sz="1000" dirty="0" err="1">
+                <a:solidFill>
+                  <a:schemeClr val="bg1"/>
+                </a:solidFill>
+              </a:rPr>
+              <a:t>t</a:t>
+            </a:r>
+            <a:r>
+              <a:rPr lang="de-DE" sz="1000" dirty="0" err="1" smtClean="0">
+                <a:solidFill>
+                  <a:schemeClr val="bg1"/>
+                </a:solidFill>
+              </a:rPr>
+              <a:t>ravis</a:t>
+            </a:r>
+            <a:r>
+              <a:rPr lang="de-DE" sz="1000" dirty="0" smtClean="0">
+                <a:solidFill>
+                  <a:schemeClr val="bg1"/>
+                </a:solidFill>
+              </a:rPr>
+              <a:t> (</a:t>
+            </a:r>
+            <a:r>
+              <a:rPr lang="de-DE" sz="1000" dirty="0" err="1" smtClean="0">
+                <a:solidFill>
+                  <a:schemeClr val="bg1"/>
+                </a:solidFill>
+              </a:rPr>
+              <a:t>continous</a:t>
+            </a:r>
+            <a:r>
+              <a:rPr lang="de-DE" sz="1000" dirty="0" smtClean="0">
+                <a:solidFill>
+                  <a:schemeClr val="bg1"/>
+                </a:solidFill>
+              </a:rPr>
+              <a:t> </a:t>
+            </a:r>
+            <a:r>
+              <a:rPr lang="de-DE" sz="1000" dirty="0" err="1" smtClean="0">
+                <a:solidFill>
+                  <a:schemeClr val="bg1"/>
+                </a:solidFill>
+              </a:rPr>
+              <a:t>integration</a:t>
+            </a:r>
+            <a:r>
+              <a:rPr lang="de-DE" sz="1000" dirty="0" smtClean="0">
+                <a:solidFill>
+                  <a:schemeClr val="bg1"/>
+                </a:solidFill>
+              </a:rPr>
+              <a:t>)</a:t>
+            </a:r>
+          </a:p>
+          <a:p>
+            <a:endParaRPr lang="de-DE" sz="1000" dirty="0" smtClean="0">
+              <a:solidFill>
+                <a:schemeClr val="bg1"/>
+              </a:solidFill>
+            </a:endParaRPr>
+          </a:p>
+        </p:txBody>
+      </p:sp>
+      <p:sp>
+        <p:nvSpPr>
+          <p:cNvPr id="22" name="Textfeld 21"/>
+          <p:cNvSpPr txBox="1"/>
+          <p:nvPr/>
+        </p:nvSpPr>
+        <p:spPr>
+          <a:xfrm>
+            <a:off x="6726840" y="1955652"/>
+            <a:ext cx="1217539" cy="175835"/>
+          </a:xfrm>
+          <a:prstGeom prst="rect">
+            <a:avLst/>
+          </a:prstGeom>
+        </p:spPr>
+        <p:txBody>
+          <a:bodyPr vert="horz" wrap="square" lIns="91440" tIns="45720" rIns="91440" bIns="45720" rtlCol="0">
+            <a:noAutofit/>
+          </a:bodyPr>
+          <a:lstStyle/>
+          <a:p>
+            <a:r>
+              <a:rPr lang="de-DE" sz="1000" dirty="0" err="1" smtClean="0">
+                <a:solidFill>
+                  <a:schemeClr val="bg1"/>
+                </a:solidFill>
+              </a:rPr>
+              <a:t>Heroku</a:t>
+            </a:r>
+            <a:r>
+              <a:rPr lang="de-DE" sz="1000" dirty="0" smtClean="0">
+                <a:solidFill>
+                  <a:schemeClr val="bg1"/>
+                </a:solidFill>
+              </a:rPr>
+              <a:t> (Hosting)</a:t>
+            </a:r>
+          </a:p>
+          <a:p>
+            <a:endParaRPr lang="de-DE" sz="1000" dirty="0" smtClean="0">
+              <a:solidFill>
+                <a:schemeClr val="bg1"/>
+              </a:solidFill>
+            </a:endParaRPr>
+          </a:p>
+        </p:txBody>
+      </p:sp>
+      <p:sp>
+        <p:nvSpPr>
+          <p:cNvPr id="23" name="Textfeld 22"/>
+          <p:cNvSpPr txBox="1"/>
+          <p:nvPr/>
+        </p:nvSpPr>
+        <p:spPr>
+          <a:xfrm>
+            <a:off x="624071" y="2054021"/>
+            <a:ext cx="1217539" cy="175835"/>
+          </a:xfrm>
+          <a:prstGeom prst="rect">
+            <a:avLst/>
+          </a:prstGeom>
+        </p:spPr>
+        <p:txBody>
+          <a:bodyPr vert="horz" wrap="square" lIns="91440" tIns="45720" rIns="91440" bIns="45720" rtlCol="0">
+            <a:noAutofit/>
+          </a:bodyPr>
+          <a:lstStyle/>
+          <a:p>
+            <a:r>
+              <a:rPr lang="de-DE" sz="1000" dirty="0" err="1" smtClean="0">
+                <a:solidFill>
+                  <a:schemeClr val="bg1"/>
+                </a:solidFill>
+              </a:rPr>
+              <a:t>developer</a:t>
+            </a:r>
+            <a:endParaRPr lang="de-DE" sz="1000" dirty="0" smtClean="0">
+              <a:solidFill>
+                <a:schemeClr val="bg1"/>
+              </a:solidFill>
+            </a:endParaRPr>
+          </a:p>
+          <a:p>
+            <a:endParaRPr lang="de-DE" sz="1000" dirty="0" smtClean="0">
+              <a:solidFill>
+                <a:schemeClr val="bg1"/>
+              </a:solidFill>
+            </a:endParaRPr>
+          </a:p>
+        </p:txBody>
+      </p:sp>
+      <p:sp>
+        <p:nvSpPr>
+          <p:cNvPr id="24" name="Textfeld 23"/>
+          <p:cNvSpPr txBox="1"/>
+          <p:nvPr/>
+        </p:nvSpPr>
+        <p:spPr>
+          <a:xfrm>
+            <a:off x="7483239" y="5750363"/>
+            <a:ext cx="1217539" cy="175835"/>
+          </a:xfrm>
+          <a:prstGeom prst="rect">
+            <a:avLst/>
+          </a:prstGeom>
+        </p:spPr>
+        <p:txBody>
+          <a:bodyPr vert="horz" wrap="square" lIns="91440" tIns="45720" rIns="91440" bIns="45720" rtlCol="0">
+            <a:noAutofit/>
+          </a:bodyPr>
+          <a:lstStyle/>
+          <a:p>
+            <a:r>
+              <a:rPr lang="de-DE" sz="1000" dirty="0" err="1" smtClean="0">
+                <a:solidFill>
+                  <a:schemeClr val="bg1"/>
+                </a:solidFill>
+              </a:rPr>
+              <a:t>tester</a:t>
+            </a:r>
+            <a:endParaRPr lang="de-DE" sz="1000" dirty="0" smtClean="0">
+              <a:solidFill>
+                <a:schemeClr val="bg1"/>
+              </a:solidFill>
+            </a:endParaRPr>
+          </a:p>
+          <a:p>
+            <a:endParaRPr lang="de-DE" sz="1000" dirty="0" smtClean="0">
+              <a:solidFill>
+                <a:schemeClr val="bg1"/>
+              </a:solidFill>
+            </a:endParaRPr>
+          </a:p>
+        </p:txBody>
+      </p:sp>
+      <p:grpSp>
+        <p:nvGrpSpPr>
+          <p:cNvPr id="25" name="Gruppieren 24"/>
+          <p:cNvGrpSpPr/>
+          <p:nvPr/>
+        </p:nvGrpSpPr>
+        <p:grpSpPr>
+          <a:xfrm>
+            <a:off x="7177493" y="5629060"/>
+            <a:ext cx="198012" cy="504056"/>
+            <a:chOff x="1547664" y="2495447"/>
+            <a:chExt cx="198012" cy="504056"/>
+          </a:xfrm>
+        </p:grpSpPr>
+        <p:sp>
+          <p:nvSpPr>
+            <p:cNvPr id="26" name="Gleichschenkliges Dreieck 25"/>
+            <p:cNvSpPr/>
+            <p:nvPr/>
+          </p:nvSpPr>
+          <p:spPr>
+            <a:xfrm>
+              <a:off x="1547664" y="2688007"/>
+              <a:ext cx="198012" cy="311496"/>
+            </a:xfrm>
+            <a:prstGeom prst="triangle">
+              <a:avLst/>
+            </a:prstGeom>
+          </p:spPr>
+          <p:style>
+            <a:lnRef idx="2">
+              <a:schemeClr val="accent1">
+                <a:shade val="50000"/>
+              </a:schemeClr>
+            </a:lnRef>
+            <a:fillRef idx="1">
+              <a:schemeClr val="accent1"/>
+            </a:fillRef>
+            <a:effectRef idx="0">
+              <a:schemeClr val="accent1"/>
+            </a:effectRef>
+            <a:fontRef idx="minor">
+              <a:schemeClr val="lt1"/>
+            </a:fontRef>
+          </p:style>
+          <p:txBody>
+            <a:bodyPr rtlCol="0" anchor="ctr"/>
+            <a:lstStyle/>
+            <a:p>
+              <a:pPr algn="ctr"/>
+              <a:endParaRPr lang="de-DE"/>
+            </a:p>
+          </p:txBody>
+        </p:sp>
+        <p:sp>
+          <p:nvSpPr>
+            <p:cNvPr id="27" name="Ellipse 26"/>
+            <p:cNvSpPr/>
+            <p:nvPr/>
+          </p:nvSpPr>
+          <p:spPr>
+            <a:xfrm>
+              <a:off x="1556670" y="2495447"/>
+              <a:ext cx="180000" cy="180000"/>
+            </a:xfrm>
+            <a:prstGeom prst="ellipse">
+              <a:avLst/>
+            </a:prstGeom>
+          </p:spPr>
+          <p:style>
+            <a:lnRef idx="2">
+              <a:schemeClr val="accent1">
+                <a:shade val="50000"/>
+              </a:schemeClr>
+            </a:lnRef>
+            <a:fillRef idx="1">
+              <a:schemeClr val="accent1"/>
+            </a:fillRef>
+            <a:effectRef idx="0">
+              <a:schemeClr val="accent1"/>
+            </a:effectRef>
+            <a:fontRef idx="minor">
+              <a:schemeClr val="lt1"/>
+            </a:fontRef>
+          </p:style>
+          <p:txBody>
+            <a:bodyPr rtlCol="0" anchor="ctr"/>
+            <a:lstStyle/>
+            <a:p>
+              <a:pPr algn="ctr"/>
+              <a:endParaRPr lang="de-DE"/>
+            </a:p>
+          </p:txBody>
+        </p:sp>
+      </p:grpSp>
+      <p:pic>
+        <p:nvPicPr>
+          <p:cNvPr id="3" name="Grafik 2"/>
+          <p:cNvPicPr>
+            <a:picLocks noChangeAspect="1"/>
+          </p:cNvPicPr>
+          <p:nvPr/>
+        </p:nvPicPr>
+        <p:blipFill>
+          <a:blip r:embed="rId7"/>
+          <a:stretch>
+            <a:fillRect/>
+          </a:stretch>
+        </p:blipFill>
+        <p:spPr>
+          <a:xfrm>
+            <a:off x="6975262" y="4338918"/>
+            <a:ext cx="507977" cy="514661"/>
+          </a:xfrm>
+          <a:prstGeom prst="rect">
+            <a:avLst/>
+          </a:prstGeom>
+        </p:spPr>
+      </p:pic>
+      <p:sp>
+        <p:nvSpPr>
+          <p:cNvPr id="28" name="Textfeld 27"/>
+          <p:cNvSpPr txBox="1"/>
+          <p:nvPr/>
+        </p:nvSpPr>
+        <p:spPr>
+          <a:xfrm>
+            <a:off x="7596336" y="4460716"/>
+            <a:ext cx="1217539" cy="175835"/>
+          </a:xfrm>
+          <a:prstGeom prst="rect">
+            <a:avLst/>
+          </a:prstGeom>
+        </p:spPr>
+        <p:txBody>
+          <a:bodyPr vert="horz" wrap="square" lIns="91440" tIns="45720" rIns="91440" bIns="45720" rtlCol="0">
+            <a:noAutofit/>
+          </a:bodyPr>
+          <a:lstStyle/>
+          <a:p>
+            <a:r>
+              <a:rPr lang="de-DE" sz="1000" dirty="0" err="1" smtClean="0">
+                <a:solidFill>
+                  <a:schemeClr val="bg1"/>
+                </a:solidFill>
+              </a:rPr>
+              <a:t>browser</a:t>
+            </a:r>
+            <a:endParaRPr lang="de-DE" sz="1000" dirty="0" smtClean="0">
+              <a:solidFill>
+                <a:schemeClr val="bg1"/>
+              </a:solidFill>
+            </a:endParaRPr>
+          </a:p>
+          <a:p>
+            <a:endParaRPr lang="de-DE" sz="1000" dirty="0" smtClean="0">
+              <a:solidFill>
+                <a:schemeClr val="bg1"/>
+              </a:solidFill>
+            </a:endParaRPr>
+          </a:p>
+        </p:txBody>
+      </p:sp>
+      <p:cxnSp>
+        <p:nvCxnSpPr>
+          <p:cNvPr id="30" name="Gerade Verbindung mit Pfeil 29"/>
+          <p:cNvCxnSpPr/>
+          <p:nvPr/>
+        </p:nvCxnSpPr>
+        <p:spPr>
+          <a:xfrm flipV="1">
+            <a:off x="7246917" y="5085184"/>
+            <a:ext cx="0" cy="399860"/>
+          </a:xfrm>
+          <a:prstGeom prst="straightConnector1">
+            <a:avLst/>
+          </a:prstGeom>
+          <a:ln w="57150">
+            <a:tailEnd type="triangle"/>
+          </a:ln>
+        </p:spPr>
+        <p:style>
+          <a:lnRef idx="1">
+            <a:schemeClr val="accent1"/>
+          </a:lnRef>
+          <a:fillRef idx="0">
+            <a:schemeClr val="accent1"/>
+          </a:fillRef>
+          <a:effectRef idx="0">
+            <a:schemeClr val="accent1"/>
+          </a:effectRef>
+          <a:fontRef idx="minor">
+            <a:schemeClr val="tx1"/>
+          </a:fontRef>
+        </p:style>
+      </p:cxnSp>
+      <p:grpSp>
+        <p:nvGrpSpPr>
+          <p:cNvPr id="8" name="Gruppieren 7"/>
+          <p:cNvGrpSpPr/>
+          <p:nvPr/>
+        </p:nvGrpSpPr>
+        <p:grpSpPr>
+          <a:xfrm>
+            <a:off x="7109595" y="3590693"/>
+            <a:ext cx="166904" cy="412648"/>
+            <a:chOff x="7199595" y="3573016"/>
+            <a:chExt cx="166904" cy="412648"/>
+          </a:xfrm>
+        </p:grpSpPr>
+        <p:cxnSp>
+          <p:nvCxnSpPr>
+            <p:cNvPr id="31" name="Gerade Verbindung mit Pfeil 30"/>
+            <p:cNvCxnSpPr/>
+            <p:nvPr/>
+          </p:nvCxnSpPr>
+          <p:spPr>
+            <a:xfrm flipV="1">
+              <a:off x="7199595" y="3573016"/>
+              <a:ext cx="0" cy="399860"/>
+            </a:xfrm>
+            <a:prstGeom prst="straightConnector1">
+              <a:avLst/>
+            </a:prstGeom>
+            <a:ln w="57150">
+              <a:tailEnd type="triangle"/>
+            </a:ln>
+          </p:spPr>
+          <p:style>
+            <a:lnRef idx="1">
+              <a:schemeClr val="accent1"/>
+            </a:lnRef>
+            <a:fillRef idx="0">
+              <a:schemeClr val="accent1"/>
+            </a:fillRef>
+            <a:effectRef idx="0">
+              <a:schemeClr val="accent1"/>
+            </a:effectRef>
+            <a:fontRef idx="minor">
+              <a:schemeClr val="tx1"/>
+            </a:fontRef>
+          </p:style>
+        </p:cxnSp>
+        <p:cxnSp>
+          <p:nvCxnSpPr>
+            <p:cNvPr id="32" name="Gerade Verbindung mit Pfeil 31"/>
+            <p:cNvCxnSpPr/>
+            <p:nvPr/>
+          </p:nvCxnSpPr>
+          <p:spPr>
+            <a:xfrm flipH="1">
+              <a:off x="7365215" y="3580906"/>
+              <a:ext cx="1284" cy="404758"/>
+            </a:xfrm>
+            <a:prstGeom prst="straightConnector1">
+              <a:avLst/>
+            </a:prstGeom>
+            <a:ln w="57150">
+              <a:tailEnd type="triangle"/>
+            </a:ln>
+          </p:spPr>
+          <p:style>
+            <a:lnRef idx="1">
+              <a:schemeClr val="accent1"/>
+            </a:lnRef>
+            <a:fillRef idx="0">
+              <a:schemeClr val="accent1"/>
+            </a:fillRef>
+            <a:effectRef idx="0">
+              <a:schemeClr val="accent1"/>
+            </a:effectRef>
+            <a:fontRef idx="minor">
+              <a:schemeClr val="tx1"/>
+            </a:fontRef>
+          </p:style>
+        </p:cxnSp>
+      </p:grpSp>
     </p:spTree>
     <p:extLst>
       <p:ext uri="{BB962C8B-B14F-4D97-AF65-F5344CB8AC3E}">

</xml_diff>